<commit_message>
Replace event on title slide
</commit_message>
<xml_diff>
--- a/Presentation/Maltego_haveibeenpwned-Presentation-Christian_Heinrich.pptx
+++ b/Presentation/Maltego_haveibeenpwned-Presentation-Christian_Heinrich.pptx
@@ -141,6 +141,10 @@
 </p:presentation>
 </file>
 
+<file path=ppt/revisionInfo.xml><?xml version="1.0" encoding="utf-8"?>
+<p1510:revInfo xmlns:a="http://schemas.openxmlformats.org/drawingml/2006/main" xmlns:r="http://schemas.openxmlformats.org/officeDocument/2006/relationships" xmlns:p1510="http://schemas.microsoft.com/office/powerpoint/2015/10/main"/>
+</file>
+
 <file path=ppt/notesMasters/notesMaster1.xml><?xml version="1.0" encoding="utf-8"?>
 <p:notesMaster xmlns:a="http://schemas.openxmlformats.org/drawingml/2006/main" xmlns:r="http://schemas.openxmlformats.org/officeDocument/2006/relationships" xmlns:p="http://schemas.openxmlformats.org/presentationml/2006/main">
   <p:cSld>
@@ -223,7 +227,7 @@
           <a:p>
             <a:fld id="{010F5F95-A659-445E-A0CB-EE67B87DFA50}" type="datetimeFigureOut">
               <a:rPr lang="en-AU" smtClean="0"/>
-              <a:t>26/03/2017</a:t>
+              <a:t>6/08/2017</a:t>
             </a:fld>
             <a:endParaRPr lang="en-AU"/>
           </a:p>
@@ -2784,7 +2788,7 @@
           <a:p>
             <a:fld id="{7EB36074-1669-4C70-99B3-7539C8DD8515}" type="datetimeFigureOut">
               <a:rPr lang="en-AU" smtClean="0"/>
-              <a:t>26/03/2017</a:t>
+              <a:t>6/08/2017</a:t>
             </a:fld>
             <a:endParaRPr lang="en-AU"/>
           </a:p>
@@ -2954,7 +2958,7 @@
           <a:p>
             <a:fld id="{7EB36074-1669-4C70-99B3-7539C8DD8515}" type="datetimeFigureOut">
               <a:rPr lang="en-AU" smtClean="0"/>
-              <a:t>26/03/2017</a:t>
+              <a:t>6/08/2017</a:t>
             </a:fld>
             <a:endParaRPr lang="en-AU"/>
           </a:p>
@@ -3134,7 +3138,7 @@
           <a:p>
             <a:fld id="{7EB36074-1669-4C70-99B3-7539C8DD8515}" type="datetimeFigureOut">
               <a:rPr lang="en-AU" smtClean="0"/>
-              <a:t>26/03/2017</a:t>
+              <a:t>6/08/2017</a:t>
             </a:fld>
             <a:endParaRPr lang="en-AU"/>
           </a:p>
@@ -3304,7 +3308,7 @@
           <a:p>
             <a:fld id="{7EB36074-1669-4C70-99B3-7539C8DD8515}" type="datetimeFigureOut">
               <a:rPr lang="en-AU" smtClean="0"/>
-              <a:t>26/03/2017</a:t>
+              <a:t>6/08/2017</a:t>
             </a:fld>
             <a:endParaRPr lang="en-AU"/>
           </a:p>
@@ -3550,7 +3554,7 @@
           <a:p>
             <a:fld id="{7EB36074-1669-4C70-99B3-7539C8DD8515}" type="datetimeFigureOut">
               <a:rPr lang="en-AU" smtClean="0"/>
-              <a:t>26/03/2017</a:t>
+              <a:t>6/08/2017</a:t>
             </a:fld>
             <a:endParaRPr lang="en-AU"/>
           </a:p>
@@ -3782,7 +3786,7 @@
           <a:p>
             <a:fld id="{7EB36074-1669-4C70-99B3-7539C8DD8515}" type="datetimeFigureOut">
               <a:rPr lang="en-AU" smtClean="0"/>
-              <a:t>26/03/2017</a:t>
+              <a:t>6/08/2017</a:t>
             </a:fld>
             <a:endParaRPr lang="en-AU"/>
           </a:p>
@@ -4149,7 +4153,7 @@
           <a:p>
             <a:fld id="{7EB36074-1669-4C70-99B3-7539C8DD8515}" type="datetimeFigureOut">
               <a:rPr lang="en-AU" smtClean="0"/>
-              <a:t>26/03/2017</a:t>
+              <a:t>6/08/2017</a:t>
             </a:fld>
             <a:endParaRPr lang="en-AU"/>
           </a:p>
@@ -4267,7 +4271,7 @@
           <a:p>
             <a:fld id="{7EB36074-1669-4C70-99B3-7539C8DD8515}" type="datetimeFigureOut">
               <a:rPr lang="en-AU" smtClean="0"/>
-              <a:t>26/03/2017</a:t>
+              <a:t>6/08/2017</a:t>
             </a:fld>
             <a:endParaRPr lang="en-AU"/>
           </a:p>
@@ -4362,7 +4366,7 @@
           <a:p>
             <a:fld id="{7EB36074-1669-4C70-99B3-7539C8DD8515}" type="datetimeFigureOut">
               <a:rPr lang="en-AU" smtClean="0"/>
-              <a:t>26/03/2017</a:t>
+              <a:t>6/08/2017</a:t>
             </a:fld>
             <a:endParaRPr lang="en-AU"/>
           </a:p>
@@ -4639,7 +4643,7 @@
           <a:p>
             <a:fld id="{7EB36074-1669-4C70-99B3-7539C8DD8515}" type="datetimeFigureOut">
               <a:rPr lang="en-AU" smtClean="0"/>
-              <a:t>26/03/2017</a:t>
+              <a:t>6/08/2017</a:t>
             </a:fld>
             <a:endParaRPr lang="en-AU"/>
           </a:p>
@@ -4892,7 +4896,7 @@
           <a:p>
             <a:fld id="{7EB36074-1669-4C70-99B3-7539C8DD8515}" type="datetimeFigureOut">
               <a:rPr lang="en-AU" smtClean="0"/>
-              <a:t>26/03/2017</a:t>
+              <a:t>6/08/2017</a:t>
             </a:fld>
             <a:endParaRPr lang="en-AU"/>
           </a:p>
@@ -5105,7 +5109,7 @@
           <a:p>
             <a:fld id="{7EB36074-1669-4C70-99B3-7539C8DD8515}" type="datetimeFigureOut">
               <a:rPr lang="en-AU" smtClean="0"/>
-              <a:t>26/03/2017</a:t>
+              <a:t>6/08/2017</a:t>
             </a:fld>
             <a:endParaRPr lang="en-AU"/>
           </a:p>
@@ -5584,6 +5588,18 @@
               <a:rPr lang="en-AU" b="1" dirty="0"/>
               <a:t>Christian Heinrich</a:t>
             </a:r>
+          </a:p>
+          <a:p>
+            <a:pPr algn="l"/>
+            <a:r>
+              <a:rPr lang="en-US" b="1" dirty="0"/>
+              <a:t>D</a:t>
+            </a:r>
+            <a:r>
+              <a:rPr lang="en-AU" b="1"/>
+              <a:t>EFCON 25 Demo Labs</a:t>
+            </a:r>
+            <a:endParaRPr lang="en-AU" b="1" dirty="0"/>
           </a:p>
           <a:p>
             <a:pPr algn="l"/>

</xml_diff>

<commit_message>
Replace Maltego Client (4.0.18) version on Slide 11
</commit_message>
<xml_diff>
--- a/Presentation/Maltego_haveibeenpwned-Presentation-Christian_Heinrich.pptx
+++ b/Presentation/Maltego_haveibeenpwned-Presentation-Christian_Heinrich.pptx
@@ -6024,7 +6024,13 @@
       </p:sp>
       <p:pic>
         <p:nvPicPr>
-          <p:cNvPr id="5" name="Picture 4"/>
+          <p:cNvPr id="2" name="Picture 1">
+            <a:extLst>
+              <a:ext uri="{FF2B5EF4-FFF2-40B4-BE49-F238E27FC236}">
+                <a16:creationId xmlns:a16="http://schemas.microsoft.com/office/drawing/2014/main" id="{C83ABDA0-D9F0-4741-813B-486EE3193719}"/>
+              </a:ext>
+            </a:extLst>
+          </p:cNvPr>
           <p:cNvPicPr>
             <a:picLocks noChangeAspect="1"/>
           </p:cNvPicPr>
@@ -6038,8 +6044,8 @@
         </p:blipFill>
         <p:spPr>
           <a:xfrm>
-            <a:off x="613148" y="1086712"/>
-            <a:ext cx="10573234" cy="5634930"/>
+            <a:off x="745333" y="1031509"/>
+            <a:ext cx="10308864" cy="5530276"/>
           </a:xfrm>
           <a:prstGeom prst="rect">
             <a:avLst/>

</xml_diff>

<commit_message>
Remove "Latest pastes" Slide 12
</commit_message>
<xml_diff>
--- a/Presentation/Maltego_haveibeenpwned-Presentation-Christian_Heinrich.pptx
+++ b/Presentation/Maltego_haveibeenpwned-Presentation-Christian_Heinrich.pptx
@@ -797,6 +797,15 @@
             <a:r>
               <a:rPr lang="en-AU" dirty="0"/>
               <a:t>https://haveibeenpwned.com/Pastes/Latest</a:t>
+            </a:r>
+          </a:p>
+          <a:p>
+            <a:endParaRPr lang="en-US" dirty="0"/>
+          </a:p>
+          <a:p>
+            <a:r>
+              <a:rPr lang="en-AU" dirty="0"/>
+              <a:t>Slide hidden due to https://www.troyhunt.com/pastes-on-have-i-been-pwned-are-no-longer-publicly-listed/</a:t>
             </a:r>
           </a:p>
         </p:txBody>
@@ -6066,7 +6075,7 @@
 </file>
 
 <file path=ppt/slides/slide12.xml><?xml version="1.0" encoding="utf-8"?>
-<p:sld xmlns:a="http://schemas.openxmlformats.org/drawingml/2006/main" xmlns:r="http://schemas.openxmlformats.org/officeDocument/2006/relationships" xmlns:p="http://schemas.openxmlformats.org/presentationml/2006/main">
+<p:sld xmlns:a="http://schemas.openxmlformats.org/drawingml/2006/main" xmlns:r="http://schemas.openxmlformats.org/officeDocument/2006/relationships" xmlns:p="http://schemas.openxmlformats.org/presentationml/2006/main" show="0">
   <p:cSld>
     <p:spTree>
       <p:nvGrpSpPr>
@@ -6146,15 +6155,15 @@
           <a:p>
             <a:pPr algn="ctr"/>
             <a:r>
-              <a:rPr lang="en-AU" b="1" dirty="0"/>
+              <a:rPr lang="en-AU" b="1" strike="sngStrike" dirty="0"/>
               <a:t>@</a:t>
             </a:r>
             <a:r>
-              <a:rPr lang="en-AU" b="1" dirty="0" err="1"/>
+              <a:rPr lang="en-AU" b="1" strike="sngStrike" dirty="0" err="1"/>
               <a:t>haveibeenpwned</a:t>
             </a:r>
             <a:r>
-              <a:rPr lang="en-AU" b="1" dirty="0"/>
+              <a:rPr lang="en-AU" b="1" strike="sngStrike" dirty="0"/>
               <a:t> - Paste</a:t>
             </a:r>
           </a:p>

</xml_diff>

<commit_message>
Insert note of slide 5 link to "Azure Ecosystem"
</commit_message>
<xml_diff>
--- a/Presentation/Maltego_haveibeenpwned-Presentation-Christian_Heinrich.pptx
+++ b/Presentation/Maltego_haveibeenpwned-Presentation-Christian_Heinrich.pptx
@@ -2177,7 +2177,10 @@
           <a:bodyPr/>
           <a:lstStyle/>
           <a:p>
-            <a:endParaRPr lang="en-AU"/>
+            <a:r>
+              <a:rPr lang="en-AU"/>
+              <a:t>https://haveibeenpwned.com/ecosystem.pdf</a:t>
+            </a:r>
           </a:p>
         </p:txBody>
       </p:sp>

</xml_diff>

<commit_message>
Fix "Thanks" slide 23
Modify @dcuthbert
Add @SudhanshuC
</commit_message>
<xml_diff>
--- a/Presentation/Maltego_haveibeenpwned-Presentation-Christian_Heinrich.pptx
+++ b/Presentation/Maltego_haveibeenpwned-Presentation-Christian_Heinrich.pptx
@@ -2178,7 +2178,7 @@
           <a:lstStyle/>
           <a:p>
             <a:r>
-              <a:rPr lang="en-AU"/>
+              <a:rPr lang="en-AU" dirty="0"/>
               <a:t>https://haveibeenpwned.com/ecosystem.pdf</a:t>
             </a:r>
           </a:p>
@@ -7886,13 +7886,13 @@
         </p:nvSpPr>
         <p:spPr>
           <a:xfrm>
-            <a:off x="729916" y="2585933"/>
-            <a:ext cx="10732168" cy="2043854"/>
+            <a:off x="729916" y="2585932"/>
+            <a:ext cx="10732168" cy="2974895"/>
           </a:xfrm>
         </p:spPr>
         <p:txBody>
           <a:bodyPr>
-            <a:normAutofit/>
+            <a:normAutofit fontScale="92500" lnSpcReduction="20000"/>
           </a:bodyPr>
           <a:lstStyle/>
           <a:p>
@@ -7916,6 +7916,38 @@
               <a:t>haveibeenpwned</a:t>
             </a:r>
             <a:endParaRPr lang="en-AU" dirty="0"/>
+          </a:p>
+          <a:p>
+            <a:pPr marL="0" indent="0">
+              <a:buNone/>
+            </a:pPr>
+            <a:endParaRPr lang="en-US" dirty="0"/>
+          </a:p>
+          <a:p>
+            <a:pPr marL="0" indent="0">
+              <a:buNone/>
+            </a:pPr>
+            <a:r>
+              <a:rPr lang="en-US" dirty="0"/>
+              <a:t>@</a:t>
+            </a:r>
+            <a:r>
+              <a:rPr lang="en-US" dirty="0" err="1"/>
+              <a:t>SudhanshuC</a:t>
+            </a:r>
+            <a:r>
+              <a:rPr lang="en-US" dirty="0"/>
+              <a:t> of the forked </a:t>
+            </a:r>
+            <a:r>
+              <a:rPr lang="en-US" dirty="0" err="1"/>
+              <a:t>Maltego</a:t>
+            </a:r>
+            <a:r>
+              <a:rPr lang="en-US"/>
+              <a:t> local transforms</a:t>
+            </a:r>
+            <a:endParaRPr lang="en-US" sz="2400" b="1" dirty="0"/>
           </a:p>
           <a:p>
             <a:pPr marL="0" indent="0">
@@ -7971,7 +8003,7 @@
             </a:r>
             <a:r>
               <a:rPr lang="en-AU" dirty="0" err="1"/>
-              <a:t>dcuthbert</a:t>
+              <a:t>NoobieDog</a:t>
             </a:r>
             <a:r>
               <a:rPr lang="en-AU" dirty="0"/>
@@ -7979,14 +8011,6 @@
             </a:r>
             <a:r>
               <a:rPr lang="en-AU" dirty="0" err="1"/>
-              <a:t>NoobieDog</a:t>
-            </a:r>
-            <a:r>
-              <a:rPr lang="en-AU" dirty="0"/>
-              <a:t>, @</a:t>
-            </a:r>
-            <a:r>
-              <a:rPr lang="en-AU" dirty="0" err="1"/>
               <a:t>glennzw</a:t>
             </a:r>
             <a:r>
@@ -8004,6 +8028,20 @@
             <a:r>
               <a:rPr lang="en-AU" dirty="0" err="1"/>
               <a:t>SensePost</a:t>
+            </a:r>
+            <a:endParaRPr lang="en-AU" dirty="0"/>
+          </a:p>
+          <a:p>
+            <a:pPr marL="0" indent="0">
+              <a:buNone/>
+            </a:pPr>
+            <a:r>
+              <a:rPr lang="en-AU" dirty="0"/>
+              <a:t>@</a:t>
+            </a:r>
+            <a:r>
+              <a:rPr lang="en-AU" dirty="0" err="1"/>
+              <a:t>dcuthbert</a:t>
             </a:r>
             <a:endParaRPr lang="en-AU" dirty="0"/>
           </a:p>

</xml_diff>

<commit_message>
Fix @Twitter account on slide 24
</commit_message>
<xml_diff>
--- a/Presentation/Maltego_haveibeenpwned-Presentation-Christian_Heinrich.pptx
+++ b/Presentation/Maltego_haveibeenpwned-Presentation-Christian_Heinrich.pptx
@@ -5597,7 +5597,7 @@
           <a:p>
             <a:pPr algn="l"/>
             <a:r>
-              <a:rPr lang="en-AU" b="1" dirty="0"/>
+              <a:rPr lang="en-AU" sz="3200" b="1" dirty="0"/>
               <a:t>Christian Heinrich</a:t>
             </a:r>
           </a:p>
@@ -5608,10 +5608,23 @@
               <a:t>D</a:t>
             </a:r>
             <a:r>
-              <a:rPr lang="en-AU" b="1"/>
-              <a:t>EFCON 25 Demo Labs</a:t>
-            </a:r>
-            <a:endParaRPr lang="en-AU" b="1" dirty="0"/>
+              <a:rPr lang="en-AU" b="1" dirty="0"/>
+              <a:t>EFCON 25 (2017)</a:t>
+            </a:r>
+          </a:p>
+          <a:p>
+            <a:pPr algn="l"/>
+            <a:r>
+              <a:rPr lang="en-AU" sz="2000" b="1" dirty="0">
+                <a:solidFill>
+                  <a:schemeClr val="tx1">
+                    <a:lumMod val="50000"/>
+                    <a:lumOff val="50000"/>
+                  </a:schemeClr>
+                </a:solidFill>
+              </a:rPr>
+              <a:t>Demo Labs</a:t>
+            </a:r>
           </a:p>
           <a:p>
             <a:pPr algn="l"/>
@@ -7944,7 +7957,7 @@
               <a:t>Maltego</a:t>
             </a:r>
             <a:r>
-              <a:rPr lang="en-US"/>
+              <a:rPr lang="en-US" dirty="0"/>
               <a:t> local transforms</a:t>
             </a:r>
             <a:endParaRPr lang="en-US" sz="2400" b="1" dirty="0"/>
@@ -8223,23 +8236,34 @@
               <a:t>Follow me on Twitter at </a:t>
             </a:r>
             <a:r>
-              <a:rPr lang="en-AU" b="1" dirty="0"/>
-              <a:t>@</a:t>
-            </a:r>
-            <a:r>
-              <a:rPr lang="en-AU" b="1" dirty="0" err="1"/>
-              <a:t>cmlh</a:t>
-            </a:r>
-            <a:endParaRPr lang="en-AU" b="1" dirty="0"/>
-          </a:p>
-          <a:p>
-            <a:pPr algn="l"/>
-            <a:r>
               <a:rPr lang="en-AU" b="1" dirty="0">
                 <a:latin typeface="Courier New" panose="02070309020205020404" pitchFamily="49" charset="0"/>
                 <a:cs typeface="Courier New" panose="02070309020205020404" pitchFamily="49" charset="0"/>
                 <a:hlinkClick r:id="rId3"/>
               </a:rPr>
+              <a:t>@</a:t>
+            </a:r>
+            <a:r>
+              <a:rPr lang="en-AU" b="1" dirty="0" err="1">
+                <a:latin typeface="Courier New" panose="02070309020205020404" pitchFamily="49" charset="0"/>
+                <a:cs typeface="Courier New" panose="02070309020205020404" pitchFamily="49" charset="0"/>
+                <a:hlinkClick r:id="rId3"/>
+              </a:rPr>
+              <a:t>cmlh</a:t>
+            </a:r>
+            <a:endParaRPr lang="en-AU" b="1" dirty="0">
+              <a:latin typeface="Courier New" panose="02070309020205020404" pitchFamily="49" charset="0"/>
+              <a:cs typeface="Courier New" panose="02070309020205020404" pitchFamily="49" charset="0"/>
+            </a:endParaRPr>
+          </a:p>
+          <a:p>
+            <a:pPr algn="l"/>
+            <a:r>
+              <a:rPr lang="en-AU" b="1" dirty="0">
+                <a:latin typeface="Courier New" panose="02070309020205020404" pitchFamily="49" charset="0"/>
+                <a:cs typeface="Courier New" panose="02070309020205020404" pitchFamily="49" charset="0"/>
+                <a:hlinkClick r:id="rId4"/>
+              </a:rPr>
               <a:t>christian.heinrich@cmlh.id.au</a:t>
             </a:r>
             <a:endParaRPr lang="en-AU" b="1" dirty="0">
@@ -8267,7 +8291,7 @@
               <a:rPr lang="en-AU" sz="2000" b="1" dirty="0">
                 <a:latin typeface="Courier New" panose="02070309020205020404" pitchFamily="49" charset="0"/>
                 <a:cs typeface="Courier New" panose="02070309020205020404" pitchFamily="49" charset="0"/>
-                <a:hlinkClick r:id="rId4"/>
+                <a:hlinkClick r:id="rId5"/>
               </a:rPr>
               <a:t>https://www.slideshare.net/cmlh/maltego-haveibeenpwned</a:t>
             </a:r>
@@ -8282,7 +8306,7 @@
               <a:rPr lang="en-AU" sz="2000" b="1" dirty="0">
                 <a:latin typeface="Courier New" panose="02070309020205020404" pitchFamily="49" charset="0"/>
                 <a:cs typeface="Courier New" panose="02070309020205020404" pitchFamily="49" charset="0"/>
-                <a:hlinkClick r:id="rId5"/>
+                <a:hlinkClick r:id="rId6"/>
               </a:rPr>
               <a:t>https://speakerdeck.com/cmlh/maltego-haveibeenpwned</a:t>
             </a:r>
@@ -8327,7 +8351,7 @@
           <p:nvPr/>
         </p:nvPicPr>
         <p:blipFill>
-          <a:blip r:embed="rId6">
+          <a:blip r:embed="rId7">
             <a:extLst>
               <a:ext uri="{28A0092B-C50C-407E-A947-70E740481C1C}">
                 <a14:useLocalDpi xmlns:a14="http://schemas.microsoft.com/office/drawing/2010/main" val="0"/>

</xml_diff>

<commit_message>
Insert @GitHub link on slide 24
</commit_message>
<xml_diff>
--- a/Presentation/Maltego_haveibeenpwned-Presentation-Christian_Heinrich.pptx
+++ b/Presentation/Maltego_haveibeenpwned-Presentation-Christian_Heinrich.pptx
@@ -1925,7 +1925,11 @@
           <a:bodyPr/>
           <a:lstStyle/>
           <a:p>
-            <a:endParaRPr lang="en-AU"/>
+            <a:r>
+              <a:rPr lang="en-US" dirty="0"/>
+              <a:t>https://twitter.com/cmlh</a:t>
+            </a:r>
+            <a:endParaRPr lang="en-AU" dirty="0"/>
           </a:p>
         </p:txBody>
       </p:sp>
@@ -8241,15 +8245,7 @@
                 <a:cs typeface="Courier New" panose="02070309020205020404" pitchFamily="49" charset="0"/>
                 <a:hlinkClick r:id="rId3"/>
               </a:rPr>
-              <a:t>@</a:t>
-            </a:r>
-            <a:r>
-              <a:rPr lang="en-AU" b="1" dirty="0" err="1">
-                <a:latin typeface="Courier New" panose="02070309020205020404" pitchFamily="49" charset="0"/>
-                <a:cs typeface="Courier New" panose="02070309020205020404" pitchFamily="49" charset="0"/>
-                <a:hlinkClick r:id="rId3"/>
-              </a:rPr>
-              <a:t>cmlh</a:t>
+              <a:t>@cmlh</a:t>
             </a:r>
             <a:endParaRPr lang="en-AU" b="1" dirty="0">
               <a:latin typeface="Courier New" panose="02070309020205020404" pitchFamily="49" charset="0"/>
@@ -8310,6 +8306,28 @@
               </a:rPr>
               <a:t>https://speakerdeck.com/cmlh/maltego-haveibeenpwned</a:t>
             </a:r>
+            <a:endParaRPr lang="en-AU" sz="2000" b="1" dirty="0">
+              <a:latin typeface="Courier New" panose="02070309020205020404" pitchFamily="49" charset="0"/>
+              <a:cs typeface="Courier New" panose="02070309020205020404" pitchFamily="49" charset="0"/>
+            </a:endParaRPr>
+          </a:p>
+          <a:p>
+            <a:pPr algn="l"/>
+            <a:r>
+              <a:rPr lang="en-AU" sz="1600" b="1" dirty="0">
+                <a:latin typeface="Courier New" panose="02070309020205020404" pitchFamily="49" charset="0"/>
+                <a:cs typeface="Courier New" panose="02070309020205020404" pitchFamily="49" charset="0"/>
+                <a:hlinkClick r:id="rId7"/>
+              </a:rPr>
+              <a:t>https://github.com/cmlh/Maltego-haveibeenpwned/tree/master/Presentation</a:t>
+            </a:r>
+            <a:endParaRPr lang="en-AU" sz="1600" b="1" dirty="0">
+              <a:latin typeface="Courier New" panose="02070309020205020404" pitchFamily="49" charset="0"/>
+              <a:cs typeface="Courier New" panose="02070309020205020404" pitchFamily="49" charset="0"/>
+            </a:endParaRPr>
+          </a:p>
+          <a:p>
+            <a:pPr algn="l"/>
             <a:endParaRPr lang="en-AU" b="1" dirty="0">
               <a:latin typeface="Courier New" panose="02070309020205020404" pitchFamily="49" charset="0"/>
               <a:cs typeface="Courier New" panose="02070309020205020404" pitchFamily="49" charset="0"/>
@@ -8351,7 +8369,7 @@
           <p:nvPr/>
         </p:nvPicPr>
         <p:blipFill>
-          <a:blip r:embed="rId7">
+          <a:blip r:embed="rId8">
             <a:extLst>
               <a:ext uri="{28A0092B-C50C-407E-A947-70E740481C1C}">
                 <a14:useLocalDpi xmlns:a14="http://schemas.microsoft.com/office/drawing/2010/main" val="0"/>

</xml_diff>

<commit_message>
Fix links in presentation slide to @SlideShare and @SpeakerDeck
</commit_message>
<xml_diff>
--- a/Presentation/Maltego_haveibeenpwned-Presentation-Christian_Heinrich.pptx
+++ b/Presentation/Maltego_haveibeenpwned-Presentation-Christian_Heinrich.pptx
@@ -7286,7 +7286,7 @@
                 <a:cs typeface="Courier New" panose="02070309020205020404" pitchFamily="49" charset="0"/>
                 <a:hlinkClick r:id="rId3"/>
               </a:rPr>
-              <a:t>https://www.slideshare.net/cmlh/maltego-haveibeenpwned</a:t>
+              <a:t>https://www.slideshare.net/cmlh/maltego-have-i-been-pwned</a:t>
             </a:r>
             <a:endParaRPr lang="en-AU" sz="2400" b="1" dirty="0">
               <a:latin typeface="Courier New" panose="02070309020205020404" pitchFamily="49" charset="0"/>
@@ -7303,9 +7303,26 @@
                 <a:cs typeface="Courier New" panose="02070309020205020404" pitchFamily="49" charset="0"/>
                 <a:hlinkClick r:id="rId4"/>
               </a:rPr>
-              <a:t>https://speakerdeck.com/cmlh/maltego-haveibeenpwned</a:t>
+              <a:t>https://speakerdeck.com/cmlh/maltego-have-i-been-pwned</a:t>
             </a:r>
             <a:endParaRPr lang="en-AU" sz="2400" b="1" dirty="0">
+              <a:latin typeface="Courier New" panose="02070309020205020404" pitchFamily="49" charset="0"/>
+              <a:cs typeface="Courier New" panose="02070309020205020404" pitchFamily="49" charset="0"/>
+            </a:endParaRPr>
+          </a:p>
+          <a:p>
+            <a:pPr marL="0" indent="0">
+              <a:buNone/>
+            </a:pPr>
+            <a:r>
+              <a:rPr lang="en-AU" sz="1800" b="1" dirty="0">
+                <a:latin typeface="Courier New" panose="02070309020205020404" pitchFamily="49" charset="0"/>
+                <a:cs typeface="Courier New" panose="02070309020205020404" pitchFamily="49" charset="0"/>
+                <a:hlinkClick r:id="rId5"/>
+              </a:rPr>
+              <a:t>https://github.com/cmlh/Maltego-haveibeenpwned/tree/master/Presentation</a:t>
+            </a:r>
+            <a:endParaRPr lang="en-AU" sz="1800" b="1" dirty="0">
               <a:latin typeface="Courier New" panose="02070309020205020404" pitchFamily="49" charset="0"/>
               <a:cs typeface="Courier New" panose="02070309020205020404" pitchFamily="49" charset="0"/>
             </a:endParaRPr>
@@ -7364,7 +7381,7 @@
           <p:nvPr/>
         </p:nvPicPr>
         <p:blipFill>
-          <a:blip r:embed="rId5">
+          <a:blip r:embed="rId6">
             <a:extLst>
               <a:ext uri="{28A0092B-C50C-407E-A947-70E740481C1C}">
                 <a14:useLocalDpi xmlns:a14="http://schemas.microsoft.com/office/drawing/2010/main" val="0"/>
@@ -8289,7 +8306,7 @@
                 <a:cs typeface="Courier New" panose="02070309020205020404" pitchFamily="49" charset="0"/>
                 <a:hlinkClick r:id="rId5"/>
               </a:rPr>
-              <a:t>https://www.slideshare.net/cmlh/maltego-haveibeenpwned</a:t>
+              <a:t>https://www.slideshare.net/cmlh/maltego-have-i-been-pwned</a:t>
             </a:r>
             <a:endParaRPr lang="en-AU" sz="2000" b="1" dirty="0">
               <a:latin typeface="Courier New" panose="02070309020205020404" pitchFamily="49" charset="0"/>
@@ -8304,7 +8321,7 @@
                 <a:cs typeface="Courier New" panose="02070309020205020404" pitchFamily="49" charset="0"/>
                 <a:hlinkClick r:id="rId6"/>
               </a:rPr>
-              <a:t>https://speakerdeck.com/cmlh/maltego-haveibeenpwned</a:t>
+              <a:t>https://speakerdeck.com/cmlh/maltego-have-i-been-pwned</a:t>
             </a:r>
             <a:endParaRPr lang="en-AU" sz="2000" b="1" dirty="0">
               <a:latin typeface="Courier New" panose="02070309020205020404" pitchFamily="49" charset="0"/>

</xml_diff>